<commit_message>
Updated after dry run on Monday
</commit_message>
<xml_diff>
--- a/review2-zurich/WP4-ReviewM18.pptx
+++ b/review2-zurich/WP4-ReviewM18.pptx
@@ -275,7 +275,7 @@
           <a:p>
             <a:fld id="{38AEA946-BE12-485E-8CED-EB49F79C0D9F}" type="datetimeFigureOut">
               <a:rPr lang="de-CH" smtClean="0"/>
-              <a:t>01.10.2017</a:t>
+              <a:t>02.10.17</a:t>
             </a:fld>
             <a:endParaRPr lang="de-CH"/>
           </a:p>
@@ -341,7 +341,7 @@
           <a:p>
             <a:fld id="{AB7FCD5B-4957-4027-8017-EFFEE2DC5C01}" type="slidenum">
               <a:rPr lang="de-CH" smtClean="0"/>
-              <a:t>‹Nr.›</a:t>
+              <a:t>‹#›</a:t>
             </a:fld>
             <a:endParaRPr lang="de-CH"/>
           </a:p>
@@ -1451,7 +1451,7 @@
             <a:fld id="{CA36C8A0-BAEB-42C3-A2D9-B1F0D6FD294D}" type="slidenum">
               <a:rPr lang="de-CH" smtClean="0"/>
               <a:pPr/>
-              <a:t>‹Nr.›</a:t>
+              <a:t>‹#›</a:t>
             </a:fld>
             <a:endParaRPr lang="de-CH" dirty="0" smtClean="0"/>
           </a:p>
@@ -2689,7 +2689,7 @@
             <a:fld id="{CA36C8A0-BAEB-42C3-A2D9-B1F0D6FD294D}" type="slidenum">
               <a:rPr lang="de-CH" smtClean="0"/>
               <a:pPr/>
-              <a:t>‹Nr.›</a:t>
+              <a:t>‹#›</a:t>
             </a:fld>
             <a:endParaRPr lang="de-CH" dirty="0" smtClean="0"/>
           </a:p>
@@ -3126,7 +3126,7 @@
             <a:fld id="{CA36C8A0-BAEB-42C3-A2D9-B1F0D6FD294D}" type="slidenum">
               <a:rPr lang="de-CH" smtClean="0"/>
               <a:pPr/>
-              <a:t>‹Nr.›</a:t>
+              <a:t>‹#›</a:t>
             </a:fld>
             <a:endParaRPr lang="de-CH" dirty="0" smtClean="0"/>
           </a:p>
@@ -3563,7 +3563,7 @@
             <a:fld id="{CA36C8A0-BAEB-42C3-A2D9-B1F0D6FD294D}" type="slidenum">
               <a:rPr lang="de-CH" smtClean="0"/>
               <a:pPr/>
-              <a:t>‹Nr.›</a:t>
+              <a:t>‹#›</a:t>
             </a:fld>
             <a:endParaRPr lang="de-CH" dirty="0" smtClean="0"/>
           </a:p>
@@ -5224,7 +5224,7 @@
           </a:ln>
           <a:extLst>
             <a:ext uri="{C572A759-6A51-4108-AA02-DFA0A04FC94B}">
-              <ma14:wrappingTextBoxFlag xmlns:ma14="http://schemas.microsoft.com/office/mac/drawingml/2011/main" xmlns="" val="1"/>
+              <ma14:wrappingTextBoxFlag xmlns:ma14="http://schemas.microsoft.com/office/mac/drawingml/2011/main" val="1"/>
             </a:ext>
           </a:extLst>
         </p:spPr>
@@ -5346,7 +5346,7 @@
             <a:fld id="{CA36C8A0-BAEB-42C3-A2D9-B1F0D6FD294D}" type="slidenum">
               <a:rPr lang="de-CH" smtClean="0"/>
               <a:pPr/>
-              <a:t>‹Nr.›</a:t>
+              <a:t>‹#›</a:t>
             </a:fld>
             <a:endParaRPr lang="de-CH" dirty="0" smtClean="0"/>
           </a:p>
@@ -6259,19 +6259,19 @@
             <a:pPr lvl="1"/>
             <a:r>
               <a:rPr lang="en-US" dirty="0" smtClean="0"/>
-              <a:t>IEEE Internet Computing, EUCNC, ANRW, ITC, SIGCOMM Reproducibility Workshop…</a:t>
-            </a:r>
-          </a:p>
-          <a:p>
+              <a:t>IEEE Internet Computing, EUCNC, ANRW, ITC, SIGCOMM </a:t>
+            </a:r>
             <a:r>
               <a:rPr lang="en-US" dirty="0" smtClean="0"/>
-              <a:t>Joint workshop with the MONROE </a:t>
-            </a:r>
+              <a:t>CCR, IEEE/IFIP CNSM…</a:t>
+            </a:r>
+            <a:endParaRPr lang="en-US" dirty="0" smtClean="0"/>
+          </a:p>
+          <a:p>
             <a:r>
               <a:rPr lang="en-US" dirty="0" smtClean="0"/>
-              <a:t>project (MS6)</a:t>
-            </a:r>
-            <a:endParaRPr lang="en-US" dirty="0" smtClean="0"/>
+              <a:t>Joint workshop with the MONROE project (MS6)</a:t>
+            </a:r>
           </a:p>
           <a:p>
             <a:pPr lvl="1"/>
@@ -6504,11 +6504,7 @@
           <a:p>
             <a:r>
               <a:rPr lang="en-GB" dirty="0" smtClean="0"/>
-              <a:t>Industrial </a:t>
-            </a:r>
-            <a:r>
-              <a:rPr lang="en-GB" dirty="0" smtClean="0"/>
-              <a:t>Exploitation</a:t>
+              <a:t>Industrial Exploitation</a:t>
             </a:r>
             <a:br>
               <a:rPr lang="en-GB" dirty="0" smtClean="0"/>
@@ -6672,11 +6668,7 @@
           <a:p>
             <a:r>
               <a:rPr lang="en-GB" dirty="0" smtClean="0"/>
-              <a:t>Considering the support for measurement facilities deployed on the </a:t>
-            </a:r>
-            <a:r>
-              <a:rPr lang="en-GB" dirty="0" smtClean="0"/>
-              <a:t>NFVI</a:t>
+              <a:t>Considering the support for measurement facilities deployed on the NFVI</a:t>
             </a:r>
             <a:endParaRPr lang="en-GB" dirty="0"/>
           </a:p>
@@ -7052,12 +7044,8 @@
               <a:t>, </a:t>
             </a:r>
             <a:r>
-              <a:rPr lang="en-GB" dirty="0" err="1" smtClean="0"/>
-              <a:t>fousing</a:t>
-            </a:r>
-            <a:r>
-              <a:rPr lang="en-GB" dirty="0" smtClean="0"/>
-              <a:t> </a:t>
+              <a:rPr lang="en-GB" dirty="0" smtClean="0"/>
+              <a:t>focusing </a:t>
             </a:r>
             <a:r>
               <a:rPr lang="en-GB" dirty="0"/>
@@ -7087,11 +7075,7 @@
             <a:pPr lvl="1"/>
             <a:r>
               <a:rPr lang="en-GB" dirty="0" smtClean="0"/>
-              <a:t>Alignment </a:t>
-            </a:r>
-            <a:r>
-              <a:rPr lang="en-GB" dirty="0" smtClean="0"/>
-              <a:t>of observatory data collection and access</a:t>
+              <a:t>Alignment of observatory data collection and access</a:t>
             </a:r>
           </a:p>
           <a:p>
@@ -7295,7 +7279,6 @@
               <a:rPr lang="en-GB" sz="2400" dirty="0" smtClean="0"/>
               <a:t>, and low-latency</a:t>
             </a:r>
-            <a:endParaRPr lang="en-GB" sz="2400" dirty="0" smtClean="0"/>
           </a:p>
           <a:p>
             <a:pPr lvl="1"/>
@@ -7305,11 +7288,44 @@
             </a:r>
             <a:r>
               <a:rPr lang="en-GB" sz="2400" dirty="0" smtClean="0"/>
-              <a:t>octoral </a:t>
+              <a:t>octoral student on </a:t>
+            </a:r>
+            <a:r>
+              <a:rPr lang="en-GB" sz="2400" dirty="0"/>
+              <a:t>MCP </a:t>
             </a:r>
             <a:r>
               <a:rPr lang="en-GB" sz="2400" dirty="0" smtClean="0"/>
-              <a:t>student </a:t>
+              <a:t>implementation and explicit </a:t>
+            </a:r>
+            <a:r>
+              <a:rPr lang="en-GB" sz="2400" dirty="0"/>
+              <a:t>protocol support of </a:t>
+            </a:r>
+            <a:r>
+              <a:rPr lang="en-GB" sz="2400" dirty="0" smtClean="0"/>
+              <a:t>passive </a:t>
+            </a:r>
+            <a:r>
+              <a:rPr lang="en-GB" sz="2400" dirty="0"/>
+              <a:t>measurement </a:t>
+            </a:r>
+          </a:p>
+          <a:p>
+            <a:r>
+              <a:rPr lang="en-GB" sz="2800" dirty="0" smtClean="0"/>
+              <a:t>ZHAW </a:t>
+            </a:r>
+          </a:p>
+          <a:p>
+            <a:pPr lvl="1"/>
+            <a:r>
+              <a:rPr lang="en-GB" sz="2400" dirty="0" smtClean="0"/>
+              <a:t>Bachelor </a:t>
+            </a:r>
+            <a:r>
+              <a:rPr lang="en-GB" sz="2400" dirty="0"/>
+              <a:t>and project theses </a:t>
             </a:r>
             <a:r>
               <a:rPr lang="en-GB" sz="2400" dirty="0" smtClean="0"/>
@@ -7317,51 +7333,6 @@
             </a:r>
             <a:r>
               <a:rPr lang="en-GB" sz="2400" dirty="0"/>
-              <a:t>MCP </a:t>
-            </a:r>
-            <a:r>
-              <a:rPr lang="en-GB" sz="2400" dirty="0" smtClean="0"/>
-              <a:t>implementation and </a:t>
-            </a:r>
-            <a:r>
-              <a:rPr lang="en-GB" sz="2400" dirty="0" smtClean="0"/>
-              <a:t>explicit </a:t>
-            </a:r>
-            <a:r>
-              <a:rPr lang="en-GB" sz="2400" dirty="0"/>
-              <a:t>protocol support of </a:t>
-            </a:r>
-            <a:r>
-              <a:rPr lang="en-GB" sz="2400" dirty="0" smtClean="0"/>
-              <a:t>passive </a:t>
-            </a:r>
-            <a:r>
-              <a:rPr lang="en-GB" sz="2400" dirty="0"/>
-              <a:t>measurement </a:t>
-            </a:r>
-          </a:p>
-          <a:p>
-            <a:r>
-              <a:rPr lang="en-GB" sz="2800" dirty="0" smtClean="0"/>
-              <a:t>ZHAW </a:t>
-            </a:r>
-          </a:p>
-          <a:p>
-            <a:pPr lvl="1"/>
-            <a:r>
-              <a:rPr lang="en-GB" sz="2400" dirty="0" smtClean="0"/>
-              <a:t>Bachelor </a:t>
-            </a:r>
-            <a:r>
-              <a:rPr lang="en-GB" sz="2400" dirty="0"/>
-              <a:t>and project theses </a:t>
-            </a:r>
-            <a:r>
-              <a:rPr lang="en-GB" sz="2400" dirty="0" smtClean="0"/>
-              <a:t>on </a:t>
-            </a:r>
-            <a:r>
-              <a:rPr lang="en-GB" sz="2400" dirty="0"/>
               <a:t>Linux kernel development </a:t>
             </a:r>
             <a:r>
@@ -7374,26 +7345,14 @@
             </a:r>
             <a:r>
               <a:rPr lang="en-GB" sz="2400" dirty="0" smtClean="0"/>
-              <a:t>protocols </a:t>
-            </a:r>
+              <a:t>protocols and observatory</a:t>
+            </a:r>
+          </a:p>
+          <a:p>
+            <a:pPr lvl="1"/>
             <a:r>
               <a:rPr lang="en-GB" sz="2400" dirty="0" smtClean="0"/>
-              <a:t>and </a:t>
-            </a:r>
-            <a:r>
-              <a:rPr lang="en-GB" sz="2400" dirty="0" smtClean="0"/>
-              <a:t>observatory</a:t>
-            </a:r>
-          </a:p>
-          <a:p>
-            <a:pPr lvl="1"/>
-            <a:r>
-              <a:rPr lang="en-GB" sz="2400" dirty="0" smtClean="0"/>
-              <a:t>T</a:t>
-            </a:r>
-            <a:r>
-              <a:rPr lang="en-GB" sz="2400" dirty="0" smtClean="0"/>
-              <a:t>eaching</a:t>
+              <a:t>Teaching</a:t>
             </a:r>
             <a:r>
               <a:rPr lang="en-GB" sz="2400" dirty="0"/>
@@ -7412,19 +7371,15 @@
               <a:t> between privacy and </a:t>
             </a:r>
             <a:r>
-              <a:rPr lang="en-GB" sz="2400" dirty="0" err="1" smtClean="0"/>
-              <a:t>managability</a:t>
+              <a:rPr lang="en-GB" sz="2400" dirty="0" smtClean="0"/>
+              <a:t>manageability</a:t>
             </a:r>
             <a:endParaRPr lang="en-GB" sz="2400" dirty="0" smtClean="0"/>
           </a:p>
           <a:p>
             <a:r>
               <a:rPr lang="en-GB" sz="2800" dirty="0" smtClean="0"/>
-              <a:t>University </a:t>
-            </a:r>
-            <a:r>
-              <a:rPr lang="en-GB" sz="2800" dirty="0" smtClean="0"/>
-              <a:t>of Aberdeen</a:t>
+              <a:t>University of Aberdeen</a:t>
             </a:r>
           </a:p>
           <a:p>
@@ -7447,11 +7402,7 @@
             <a:pPr lvl="1"/>
             <a:r>
               <a:rPr lang="en-GB" sz="2400" dirty="0" smtClean="0"/>
-              <a:t>basis  to </a:t>
-            </a:r>
-            <a:r>
-              <a:rPr lang="en-GB" sz="2400" dirty="0" smtClean="0"/>
-              <a:t>stimulate </a:t>
+              <a:t>basis  to stimulate </a:t>
             </a:r>
             <a:r>
               <a:rPr lang="en-GB" sz="2400" dirty="0"/>
@@ -7469,7 +7420,6 @@
               <a:rPr lang="en-GB" sz="2400" dirty="0" smtClean="0"/>
               <a:t>players</a:t>
             </a:r>
-            <a:endParaRPr lang="en-GB" sz="2400" dirty="0" smtClean="0"/>
           </a:p>
           <a:p>
             <a:r>
@@ -7493,11 +7443,7 @@
             </a:r>
             <a:r>
               <a:rPr lang="en-GB" sz="2400" dirty="0" smtClean="0"/>
-              <a:t>and leveraging results/experience </a:t>
-            </a:r>
-            <a:r>
-              <a:rPr lang="en-GB" sz="2400" dirty="0" smtClean="0"/>
-              <a:t>in </a:t>
+              <a:t>and leveraging results/experience in </a:t>
             </a:r>
             <a:r>
               <a:rPr lang="en-GB" sz="2400" dirty="0"/>
@@ -7511,11 +7457,7 @@
           <a:p>
             <a:r>
               <a:rPr lang="en-GB" sz="2800" dirty="0" smtClean="0"/>
-              <a:t>University </a:t>
-            </a:r>
-            <a:r>
-              <a:rPr lang="en-GB" sz="2800" dirty="0" smtClean="0"/>
-              <a:t>of Liege </a:t>
+              <a:t>University of Liege </a:t>
             </a:r>
           </a:p>
           <a:p>
@@ -7530,11 +7472,7 @@
             </a:r>
             <a:r>
               <a:rPr lang="en-GB" sz="2400" dirty="0" smtClean="0"/>
-              <a:t>interference </a:t>
-            </a:r>
-            <a:r>
-              <a:rPr lang="en-GB" sz="2400" dirty="0" smtClean="0"/>
-              <a:t>and modelling </a:t>
+              <a:t>interference and modelling </a:t>
             </a:r>
           </a:p>
         </p:txBody>
@@ -7643,11 +7581,7 @@
           <a:p>
             <a:r>
               <a:rPr lang="en-US" dirty="0" smtClean="0"/>
-              <a:t>MAMI </a:t>
-            </a:r>
-            <a:r>
-              <a:rPr lang="en-US" dirty="0" smtClean="0"/>
-              <a:t>code hosted </a:t>
+              <a:t>MAMI code hosted </a:t>
             </a:r>
             <a:r>
               <a:rPr lang="en-US" dirty="0"/>
@@ -7681,12 +7615,9 @@
             <a:pPr lvl="1"/>
             <a:r>
               <a:rPr lang="en-US" dirty="0" smtClean="0"/>
-              <a:t>Up </a:t>
-            </a:r>
-            <a:r>
-              <a:rPr lang="en-US" dirty="0" smtClean="0"/>
-              <a:t>to 42 by June 2017</a:t>
-            </a:r>
+              <a:t>46 repos</a:t>
+            </a:r>
+            <a:endParaRPr lang="en-US" dirty="0" smtClean="0"/>
           </a:p>
           <a:p>
             <a:r>
@@ -7695,19 +7626,7 @@
             </a:r>
             <a:r>
               <a:rPr lang="en-US" dirty="0" smtClean="0"/>
-              <a:t> </a:t>
-            </a:r>
-            <a:r>
-              <a:rPr lang="en-US" dirty="0" smtClean="0"/>
-              <a:t>releases </a:t>
-            </a:r>
-            <a:r>
-              <a:rPr lang="en-US" dirty="0" smtClean="0"/>
-              <a:t>(through </a:t>
-            </a:r>
-            <a:r>
-              <a:rPr lang="en-US" dirty="0" smtClean="0"/>
-              <a:t>software </a:t>
+              <a:t> releases (through software </a:t>
             </a:r>
             <a:r>
               <a:rPr lang="en-US" dirty="0"/>
@@ -7717,7 +7636,6 @@
               <a:rPr lang="en-US" dirty="0" smtClean="0"/>
               <a:t>systems)</a:t>
             </a:r>
-            <a:endParaRPr lang="en-US" dirty="0" smtClean="0"/>
           </a:p>
           <a:p>
             <a:pPr lvl="1"/>
@@ -7819,14 +7737,13 @@
               <a:t>2.0.0 is coming </a:t>
             </a:r>
             <a:r>
-              <a:rPr lang="en-US" dirty="0" err="1" smtClean="0"/>
-              <a:t>sonn</a:t>
+              <a:rPr lang="en-US" dirty="0" smtClean="0"/>
+              <a:t>soon</a:t>
             </a:r>
             <a:r>
               <a:rPr lang="en-US" dirty="0" smtClean="0"/>
               <a:t>!</a:t>
             </a:r>
-            <a:endParaRPr lang="en-US" dirty="0" smtClean="0"/>
           </a:p>
           <a:p>
             <a:r>
@@ -7943,7 +7860,7 @@
         <p:spPr/>
         <p:txBody>
           <a:bodyPr>
-            <a:normAutofit lnSpcReduction="10000"/>
+            <a:normAutofit fontScale="92500" lnSpcReduction="10000"/>
           </a:bodyPr>
           <a:lstStyle/>
           <a:p>
@@ -7976,7 +7893,6 @@
               <a:rPr lang="en-GB" dirty="0" smtClean="0"/>
               <a:t> </a:t>
             </a:r>
-            <a:endParaRPr lang="en-GB" dirty="0" smtClean="0"/>
           </a:p>
           <a:p>
             <a:pPr lvl="2"/>
@@ -8009,18 +7925,18 @@
             </a:r>
             <a:r>
               <a:rPr lang="en-GB" dirty="0" smtClean="0"/>
-              <a:t> (the MAMI </a:t>
-            </a:r>
-            <a:r>
-              <a:rPr lang="en-GB" dirty="0" smtClean="0"/>
-              <a:t>PTO)</a:t>
+              <a:t> (the MAMI PTO)</a:t>
             </a:r>
           </a:p>
           <a:p>
             <a:pPr lvl="2"/>
             <a:r>
-              <a:rPr lang="en-GB" dirty="0" smtClean="0"/>
-              <a:t>available </a:t>
+              <a:rPr lang="en-GB" dirty="0"/>
+              <a:t>A</a:t>
+            </a:r>
+            <a:r>
+              <a:rPr lang="en-GB" dirty="0" smtClean="0"/>
+              <a:t>vailable </a:t>
             </a:r>
             <a:r>
               <a:rPr lang="en-GB" dirty="0" smtClean="0"/>
@@ -8053,19 +7969,20 @@
               <a:rPr lang="en-GB" dirty="0" smtClean="0"/>
               <a:t> </a:t>
             </a:r>
+            <a:endParaRPr lang="en-GB" dirty="0" smtClean="0"/>
+          </a:p>
+          <a:p>
             <a:r>
               <a:rPr lang="en-GB" dirty="0" smtClean="0"/>
               <a:t>The </a:t>
             </a:r>
             <a:r>
               <a:rPr lang="en-GB" dirty="0" smtClean="0"/>
-              <a:t>MAMI Twitter account</a:t>
-            </a:r>
-          </a:p>
-          <a:p>
-            <a:r>
-              <a:rPr lang="en-GB" dirty="0" smtClean="0"/>
-              <a:t>@</a:t>
+              <a:t>MAMI Twitter </a:t>
+            </a:r>
+            <a:r>
+              <a:rPr lang="en-GB" dirty="0" smtClean="0"/>
+              <a:t>account - @</a:t>
             </a:r>
             <a:r>
               <a:rPr lang="en-GB" dirty="0" err="1" smtClean="0"/>
@@ -8081,19 +7998,7 @@
             <a:pPr lvl="1"/>
             <a:r>
               <a:rPr lang="en-GB" dirty="0" smtClean="0"/>
-              <a:t>Stats </a:t>
-            </a:r>
-            <a:r>
-              <a:rPr lang="en-GB" dirty="0" smtClean="0"/>
-              <a:t>by 29 </a:t>
-            </a:r>
-            <a:r>
-              <a:rPr lang="en-GB" dirty="0"/>
-              <a:t>June </a:t>
-            </a:r>
-            <a:r>
-              <a:rPr lang="en-GB" dirty="0" smtClean="0"/>
-              <a:t>2017: 135 followers, </a:t>
+              <a:t>151followers </a:t>
             </a:r>
             <a:endParaRPr lang="en-GB" dirty="0" smtClean="0"/>
           </a:p>
@@ -8235,11 +8140,7 @@
             <a:pPr lvl="1"/>
             <a:r>
               <a:rPr lang="en-US" dirty="0" smtClean="0"/>
-              <a:t>T</a:t>
-            </a:r>
-            <a:r>
-              <a:rPr lang="en-US" dirty="0" smtClean="0"/>
-              <a:t>echnical contributions to create and influence new standards, especially within IETF/IRTF</a:t>
+              <a:t>Technical contributions to create and influence new standards, especially within IETF/IRTF</a:t>
             </a:r>
             <a:r>
               <a:rPr lang="en-US" dirty="0"/>
@@ -8294,7 +8195,6 @@
               <a:rPr lang="en-US" dirty="0" smtClean="0"/>
               <a:t>)</a:t>
             </a:r>
-            <a:endParaRPr lang="en-US" dirty="0" smtClean="0"/>
           </a:p>
           <a:p>
             <a:r>
@@ -8306,15 +8206,7 @@
             <a:pPr lvl="1"/>
             <a:r>
               <a:rPr lang="en-US" dirty="0" smtClean="0"/>
-              <a:t>Focus on PTO </a:t>
-            </a:r>
-            <a:r>
-              <a:rPr lang="en-US" dirty="0" smtClean="0"/>
-              <a:t>and m</a:t>
-            </a:r>
-            <a:r>
-              <a:rPr lang="en-US" dirty="0" smtClean="0"/>
-              <a:t>easurements performed by various tools such as </a:t>
+              <a:t>Focus on PTO and measurements performed by various tools such as </a:t>
             </a:r>
             <a:r>
               <a:rPr lang="en-US" dirty="0" err="1" smtClean="0"/>
@@ -8338,7 +8230,7 @@
             </a:r>
             <a:r>
               <a:rPr lang="en-US" b="1" dirty="0" smtClean="0"/>
-              <a:t>M11</a:t>
+              <a:t>MS11</a:t>
             </a:r>
             <a:r>
               <a:rPr lang="en-US" dirty="0" smtClean="0"/>
@@ -8348,15 +8240,7 @@
           <a:p>
             <a:r>
               <a:rPr lang="en-US" dirty="0" smtClean="0"/>
-              <a:t>Identification of key application(s) for the MCP </a:t>
-            </a:r>
-            <a:r>
-              <a:rPr lang="en-US" dirty="0" smtClean="0"/>
-              <a:t>and </a:t>
-            </a:r>
-            <a:r>
-              <a:rPr lang="en-US" dirty="0" smtClean="0"/>
-              <a:t>exploitation of project results</a:t>
+              <a:t>Identification of key application(s) for the MCP and exploitation of project results</a:t>
             </a:r>
           </a:p>
           <a:p>
@@ -8379,7 +8263,6 @@
               <a:rPr lang="en-US" dirty="0" smtClean="0"/>
               <a:t>Further explore direct collaboration in measurements and the PTO itself</a:t>
             </a:r>
-            <a:endParaRPr lang="en-US" dirty="0" smtClean="0"/>
           </a:p>
         </p:txBody>
       </p:sp>
@@ -8522,11 +8405,7 @@
           <a:p>
             <a:r>
               <a:rPr lang="en-GB" dirty="0" smtClean="0"/>
-              <a:t>Exploitation </a:t>
-            </a:r>
-            <a:r>
-              <a:rPr lang="en-GB" dirty="0" smtClean="0"/>
-              <a:t>and Innovation Management</a:t>
+              <a:t>Exploitation and Innovation Management</a:t>
             </a:r>
           </a:p>
           <a:p>
@@ -8539,17 +8418,8 @@
           <a:p>
             <a:r>
               <a:rPr lang="en-GB" dirty="0" smtClean="0"/>
-              <a:t>Public </a:t>
-            </a:r>
-            <a:r>
-              <a:rPr lang="en-GB" dirty="0" smtClean="0"/>
-              <a:t>Communication </a:t>
-            </a:r>
-            <a:r>
-              <a:rPr lang="en-GB" dirty="0" smtClean="0"/>
-              <a:t>Activities</a:t>
-            </a:r>
-            <a:endParaRPr lang="en-GB" dirty="0" smtClean="0"/>
+              <a:t>Public Communication Activities</a:t>
+            </a:r>
           </a:p>
         </p:txBody>
       </p:sp>
@@ -9884,11 +9754,7 @@
           <a:p>
             <a:r>
               <a:rPr lang="en-GB" dirty="0" smtClean="0"/>
-              <a:t>Standardisation </a:t>
-            </a:r>
-            <a:r>
-              <a:rPr lang="en-GB" dirty="0" smtClean="0"/>
-              <a:t>Targets</a:t>
+              <a:t>Standardisation Targets</a:t>
             </a:r>
             <a:br>
               <a:rPr lang="en-GB" dirty="0" smtClean="0"/>
@@ -9928,11 +9794,7 @@
             <a:pPr lvl="1"/>
             <a:r>
               <a:rPr lang="en-GB" dirty="0" smtClean="0"/>
-              <a:t>Transport: TAPS</a:t>
-            </a:r>
-            <a:r>
-              <a:rPr lang="en-GB" dirty="0" smtClean="0"/>
-              <a:t>, QUIC, </a:t>
+              <a:t>Transport: TAPS, QUIC, </a:t>
             </a:r>
             <a:r>
               <a:rPr lang="en-GB" dirty="0" err="1" smtClean="0"/>
@@ -9955,7 +9817,7 @@
             <a:pPr lvl="1"/>
             <a:r>
               <a:rPr lang="en-GB" dirty="0" smtClean="0"/>
-              <a:t>NFV: I2NSF</a:t>
+              <a:t>I2NSF</a:t>
             </a:r>
             <a:r>
               <a:rPr lang="en-GB" dirty="0" smtClean="0"/>
@@ -10006,7 +9868,6 @@
               <a:rPr lang="en-GB" dirty="0" smtClean="0"/>
               <a:t>protocols</a:t>
             </a:r>
-            <a:endParaRPr lang="en-GB" dirty="0" smtClean="0"/>
           </a:p>
           <a:p>
             <a:pPr lvl="1"/>
@@ -10020,13 +9881,8 @@
             <a:pPr lvl="1"/>
             <a:r>
               <a:rPr lang="en-GB" dirty="0" smtClean="0"/>
-              <a:t>NFVRG: VNF deployment. Trust models and network-application </a:t>
-            </a:r>
-            <a:r>
-              <a:rPr lang="en-GB" dirty="0" smtClean="0"/>
-              <a:t>communication</a:t>
-            </a:r>
-            <a:endParaRPr lang="en-GB" dirty="0" smtClean="0"/>
+              <a:t>NFVRG: VNF deployment. Trust models and network-application communication</a:t>
+            </a:r>
           </a:p>
         </p:txBody>
       </p:sp>
@@ -10109,18 +9965,22 @@
           <a:p>
             <a:r>
               <a:rPr lang="en-GB" dirty="0" smtClean="0"/>
-              <a:t>Standardisation </a:t>
-            </a:r>
-            <a:r>
-              <a:rPr lang="en-GB" dirty="0" smtClean="0"/>
-              <a:t>Targets</a:t>
+              <a:t>Standardisation Targets</a:t>
             </a:r>
             <a:br>
               <a:rPr lang="en-GB" dirty="0" smtClean="0"/>
             </a:br>
             <a:r>
               <a:rPr lang="en-GB" dirty="0" smtClean="0"/>
-              <a:t>ETSI, IEEE, GSMA, and 5G</a:t>
+              <a:t>ETSI, </a:t>
+            </a:r>
+            <a:r>
+              <a:rPr lang="en-GB" dirty="0" smtClean="0"/>
+              <a:t>IEEE, </a:t>
+            </a:r>
+            <a:r>
+              <a:rPr lang="en-GB" dirty="0" smtClean="0"/>
+              <a:t>and 5G</a:t>
             </a:r>
             <a:endParaRPr lang="en-GB" dirty="0"/>
           </a:p>
@@ -10139,7 +9999,7 @@
         <p:spPr/>
         <p:txBody>
           <a:bodyPr>
-            <a:normAutofit fontScale="92500" lnSpcReduction="20000"/>
+            <a:normAutofit fontScale="92500" lnSpcReduction="10000"/>
           </a:bodyPr>
           <a:lstStyle/>
           <a:p>
@@ -10212,25 +10072,6 @@
               <a:rPr lang="en-GB" dirty="0" smtClean="0"/>
               <a:t>WG</a:t>
             </a:r>
-          </a:p>
-          <a:p>
-            <a:r>
-              <a:rPr lang="en-GB" b="1" dirty="0" smtClean="0"/>
-              <a:t>GSMA</a:t>
-            </a:r>
-            <a:r>
-              <a:rPr lang="en-GB" dirty="0" smtClean="0"/>
-              <a:t>: </a:t>
-            </a:r>
-            <a:r>
-              <a:rPr lang="en-GB" dirty="0" err="1" smtClean="0"/>
-              <a:t>LoLa</a:t>
-            </a:r>
-            <a:r>
-              <a:rPr lang="en-GB" dirty="0" smtClean="0"/>
-              <a:t> experiment</a:t>
-            </a:r>
-            <a:endParaRPr lang="en-GB" dirty="0"/>
           </a:p>
           <a:p>
             <a:r>
@@ -10269,273 +10110,6 @@
               <a:t>5</a:t>
             </a:fld>
             <a:endParaRPr lang="en-GB" dirty="0" smtClean="0"/>
-          </a:p>
-        </p:txBody>
-      </p:sp>
-      <p:sp>
-        <p:nvSpPr>
-          <p:cNvPr id="6" name="Textfeld 5"/>
-          <p:cNvSpPr txBox="1"/>
-          <p:nvPr/>
-        </p:nvSpPr>
-        <p:spPr>
-          <a:xfrm>
-            <a:off x="5832152" y="7469088"/>
-            <a:ext cx="6681316" cy="656590"/>
-          </a:xfrm>
-          <a:prstGeom prst="rect">
-            <a:avLst/>
-          </a:prstGeom>
-          <a:noFill/>
-          <a:ln w="12700" cap="flat">
-            <a:noFill/>
-            <a:miter lim="400000"/>
-          </a:ln>
-          <a:effectLst/>
-        </p:spPr>
-        <p:style>
-          <a:lnRef idx="0">
-            <a:scrgbClr r="0" g="0" b="0"/>
-          </a:lnRef>
-          <a:fillRef idx="0">
-            <a:scrgbClr r="0" g="0" b="0"/>
-          </a:fillRef>
-          <a:effectRef idx="0">
-            <a:scrgbClr r="0" g="0" b="0"/>
-          </a:effectRef>
-          <a:fontRef idx="none"/>
-        </p:style>
-        <p:txBody>
-          <a:bodyPr rot="0" spcFirstLastPara="1" vertOverflow="overflow" horzOverflow="overflow" vert="horz" wrap="none" lIns="50800" tIns="50800" rIns="50800" bIns="50800" numCol="1" spcCol="38100" rtlCol="0" anchor="ctr">
-            <a:spAutoFit/>
-          </a:bodyPr>
-          <a:lstStyle/>
-          <a:p>
-            <a:pPr marL="0" marR="0" indent="0" algn="l" defTabSz="1295400" rtl="0" fontAlgn="auto" latinLnBrk="1" hangingPunct="0">
-              <a:lnSpc>
-                <a:spcPct val="100000"/>
-              </a:lnSpc>
-              <a:spcBef>
-                <a:spcPts val="0"/>
-              </a:spcBef>
-              <a:spcAft>
-                <a:spcPts val="0"/>
-              </a:spcAft>
-              <a:buClr>
-                <a:srgbClr val="000000"/>
-              </a:buClr>
-              <a:buSzTx/>
-              <a:buFontTx/>
-              <a:buNone/>
-              <a:tabLst/>
-            </a:pPr>
-            <a:r>
-              <a:rPr kumimoji="0" lang="de-DE" sz="3600" b="1" i="0" u="none" strike="noStrike" cap="none" spc="0" normalizeH="0" baseline="0" dirty="0" smtClean="0">
-                <a:ln>
-                  <a:noFill/>
-                </a:ln>
-                <a:solidFill>
-                  <a:srgbClr val="FF0000"/>
-                </a:solidFill>
-                <a:effectLst/>
-                <a:uFill>
-                  <a:solidFill>
-                    <a:srgbClr val="000000"/>
-                  </a:solidFill>
-                </a:uFill>
-                <a:latin typeface="+mn-lt"/>
-                <a:ea typeface="+mn-ea"/>
-                <a:cs typeface="+mn-cs"/>
-                <a:sym typeface="Helvetica Neue"/>
-              </a:rPr>
-              <a:t>GSMA</a:t>
-            </a:r>
-            <a:r>
-              <a:rPr kumimoji="0" lang="de-DE" sz="3600" b="1" i="0" u="none" strike="noStrike" cap="none" spc="0" normalizeH="0" dirty="0" smtClean="0">
-                <a:ln>
-                  <a:noFill/>
-                </a:ln>
-                <a:solidFill>
-                  <a:srgbClr val="FF0000"/>
-                </a:solidFill>
-                <a:effectLst/>
-                <a:uFill>
-                  <a:solidFill>
-                    <a:srgbClr val="000000"/>
-                  </a:solidFill>
-                </a:uFill>
-                <a:latin typeface="+mn-lt"/>
-                <a:ea typeface="+mn-ea"/>
-                <a:cs typeface="+mn-cs"/>
-                <a:sym typeface="Helvetica Neue"/>
-              </a:rPr>
-              <a:t> </a:t>
-            </a:r>
-            <a:r>
-              <a:rPr kumimoji="0" lang="de-DE" sz="3600" b="1" i="0" u="none" strike="noStrike" cap="none" spc="0" normalizeH="0" dirty="0" err="1" smtClean="0">
-                <a:ln>
-                  <a:noFill/>
-                </a:ln>
-                <a:solidFill>
-                  <a:srgbClr val="FF0000"/>
-                </a:solidFill>
-                <a:effectLst/>
-                <a:uFill>
-                  <a:solidFill>
-                    <a:srgbClr val="000000"/>
-                  </a:solidFill>
-                </a:uFill>
-                <a:latin typeface="+mn-lt"/>
-                <a:ea typeface="+mn-ea"/>
-                <a:cs typeface="+mn-cs"/>
-                <a:sym typeface="Helvetica Neue"/>
-              </a:rPr>
-              <a:t>added</a:t>
-            </a:r>
-            <a:r>
-              <a:rPr kumimoji="0" lang="de-DE" sz="3600" b="1" i="0" u="none" strike="noStrike" cap="none" spc="0" normalizeH="0" dirty="0" smtClean="0">
-                <a:ln>
-                  <a:noFill/>
-                </a:ln>
-                <a:solidFill>
-                  <a:srgbClr val="FF0000"/>
-                </a:solidFill>
-                <a:effectLst/>
-                <a:uFill>
-                  <a:solidFill>
-                    <a:srgbClr val="000000"/>
-                  </a:solidFill>
-                </a:uFill>
-                <a:latin typeface="+mn-lt"/>
-                <a:ea typeface="+mn-ea"/>
-                <a:cs typeface="+mn-cs"/>
-                <a:sym typeface="Helvetica Neue"/>
-              </a:rPr>
-              <a:t> </a:t>
-            </a:r>
-            <a:r>
-              <a:rPr kumimoji="0" lang="de-DE" sz="3600" b="1" i="0" u="none" strike="noStrike" cap="none" spc="0" normalizeH="0" baseline="0" dirty="0" smtClean="0">
-                <a:ln>
-                  <a:noFill/>
-                </a:ln>
-                <a:solidFill>
-                  <a:srgbClr val="FF0000"/>
-                </a:solidFill>
-                <a:effectLst/>
-                <a:uFill>
-                  <a:solidFill>
-                    <a:srgbClr val="000000"/>
-                  </a:solidFill>
-                </a:uFill>
-                <a:latin typeface="+mn-lt"/>
-                <a:ea typeface="+mn-ea"/>
-                <a:cs typeface="+mn-cs"/>
-                <a:sym typeface="Helvetica Neue"/>
-              </a:rPr>
-              <a:t>-&gt; </a:t>
-            </a:r>
-            <a:r>
-              <a:rPr kumimoji="0" lang="de-DE" sz="3600" b="1" i="0" u="none" strike="noStrike" cap="none" spc="0" normalizeH="0" baseline="0" dirty="0" err="1" smtClean="0">
-                <a:ln>
-                  <a:noFill/>
-                </a:ln>
-                <a:solidFill>
-                  <a:srgbClr val="FF0000"/>
-                </a:solidFill>
-                <a:effectLst/>
-                <a:uFill>
-                  <a:solidFill>
-                    <a:srgbClr val="000000"/>
-                  </a:solidFill>
-                </a:uFill>
-                <a:latin typeface="+mn-lt"/>
-                <a:ea typeface="+mn-ea"/>
-                <a:cs typeface="+mn-cs"/>
-                <a:sym typeface="Helvetica Neue"/>
-              </a:rPr>
-              <a:t>see</a:t>
-            </a:r>
-            <a:r>
-              <a:rPr kumimoji="0" lang="de-DE" sz="3600" b="1" i="0" u="none" strike="noStrike" cap="none" spc="0" normalizeH="0" baseline="0" dirty="0" smtClean="0">
-                <a:ln>
-                  <a:noFill/>
-                </a:ln>
-                <a:solidFill>
-                  <a:srgbClr val="FF0000"/>
-                </a:solidFill>
-                <a:effectLst/>
-                <a:uFill>
-                  <a:solidFill>
-                    <a:srgbClr val="000000"/>
-                  </a:solidFill>
-                </a:uFill>
-                <a:latin typeface="+mn-lt"/>
-                <a:ea typeface="+mn-ea"/>
-                <a:cs typeface="+mn-cs"/>
-                <a:sym typeface="Helvetica Neue"/>
-              </a:rPr>
-              <a:t> </a:t>
-            </a:r>
-            <a:r>
-              <a:rPr kumimoji="0" lang="de-DE" sz="3600" b="1" i="0" u="none" strike="noStrike" cap="none" spc="0" normalizeH="0" baseline="0" dirty="0" err="1" smtClean="0">
-                <a:ln>
-                  <a:noFill/>
-                </a:ln>
-                <a:solidFill>
-                  <a:srgbClr val="FF0000"/>
-                </a:solidFill>
-                <a:effectLst/>
-                <a:uFill>
-                  <a:solidFill>
-                    <a:srgbClr val="000000"/>
-                  </a:solidFill>
-                </a:uFill>
-                <a:latin typeface="+mn-lt"/>
-                <a:ea typeface="+mn-ea"/>
-                <a:cs typeface="+mn-cs"/>
-                <a:sym typeface="Helvetica Neue"/>
-              </a:rPr>
-              <a:t>webpage</a:t>
-            </a:r>
-            <a:r>
-              <a:rPr kumimoji="0" lang="de-DE" sz="3600" b="1" i="0" u="none" strike="noStrike" cap="none" spc="0" normalizeH="0" baseline="0" dirty="0" smtClean="0">
-                <a:ln>
-                  <a:noFill/>
-                </a:ln>
-                <a:solidFill>
-                  <a:srgbClr val="FF0000"/>
-                </a:solidFill>
-                <a:effectLst/>
-                <a:uFill>
-                  <a:solidFill>
-                    <a:srgbClr val="000000"/>
-                  </a:solidFill>
-                </a:uFill>
-                <a:latin typeface="+mn-lt"/>
-                <a:ea typeface="+mn-ea"/>
-                <a:cs typeface="+mn-cs"/>
-                <a:sym typeface="Helvetica Neue"/>
-              </a:rPr>
-              <a:t>!</a:t>
-            </a:r>
-            <a:endParaRPr kumimoji="0" lang="en-US" sz="3600" b="1" i="0" u="none" strike="noStrike" cap="none" spc="0" normalizeH="0" baseline="0" dirty="0">
-              <a:ln>
-                <a:noFill/>
-              </a:ln>
-              <a:solidFill>
-                <a:srgbClr val="FF0000"/>
-              </a:solidFill>
-              <a:effectLst/>
-              <a:uFill>
-                <a:solidFill>
-                  <a:srgbClr val="000000"/>
-                </a:solidFill>
-              </a:uFill>
-              <a:latin typeface="+mn-lt"/>
-              <a:ea typeface="+mn-ea"/>
-              <a:cs typeface="+mn-cs"/>
-              <a:sym typeface="Helvetica Neue"/>
-            </a:endParaRPr>
           </a:p>
         </p:txBody>
       </p:sp>
@@ -10656,11 +10230,7 @@
             </a:r>
             <a:r>
               <a:rPr lang="en-GB" dirty="0" smtClean="0"/>
-              <a:t>mechanism developed in MAMI for</a:t>
-            </a:r>
-            <a:r>
-              <a:rPr lang="en-GB" dirty="0" smtClean="0"/>
-              <a:t> protocol design in existing IETF working groups, e.g. measurability in QUIC</a:t>
+              <a:t>mechanism developed in MAMI for protocol design in existing IETF working groups, e.g. measurability in QUIC</a:t>
             </a:r>
           </a:p>
           <a:p>
@@ -10710,11 +10280,7 @@
             <a:pPr lvl="1"/>
             <a:r>
               <a:rPr lang="en-GB" dirty="0" smtClean="0"/>
-              <a:t>Individual </a:t>
-            </a:r>
-            <a:r>
-              <a:rPr lang="en-GB" dirty="0" smtClean="0"/>
-              <a:t>submission introducing the PLUS transport-independent </a:t>
+              <a:t>Individual submission introducing the PLUS transport-independent </a:t>
             </a:r>
             <a:r>
               <a:rPr lang="en-GB" dirty="0"/>
@@ -10755,49 +10321,28 @@
           <a:p>
             <a:r>
               <a:rPr lang="en-GB" dirty="0" smtClean="0"/>
-              <a:t>Building </a:t>
-            </a:r>
-            <a:r>
-              <a:rPr lang="en-GB" dirty="0" smtClean="0"/>
-              <a:t>awareness in ETSI</a:t>
+              <a:t>Building awareness in ETSI</a:t>
             </a:r>
           </a:p>
           <a:p>
             <a:pPr lvl="1"/>
             <a:r>
               <a:rPr lang="en-GB" dirty="0" smtClean="0"/>
-              <a:t>Periodic reports to NFV </a:t>
-            </a:r>
-            <a:r>
-              <a:rPr lang="en-GB" dirty="0" smtClean="0"/>
-              <a:t>plenaries</a:t>
-            </a:r>
-            <a:endParaRPr lang="en-GB" dirty="0" smtClean="0"/>
+              <a:t>Periodic reports to NFV plenaries</a:t>
+            </a:r>
           </a:p>
           <a:p>
             <a:pPr lvl="1"/>
             <a:r>
               <a:rPr lang="en-GB" dirty="0" smtClean="0"/>
-              <a:t>Contributions to TC CYBER on the applicability of </a:t>
-            </a:r>
-            <a:r>
-              <a:rPr lang="en-GB" dirty="0" smtClean="0"/>
-              <a:t>MCP:</a:t>
+              <a:t>Contributions to TC CYBER on the applicability of MCP:</a:t>
             </a:r>
           </a:p>
           <a:p>
             <a:pPr lvl="2"/>
             <a:r>
               <a:rPr lang="en-GB" dirty="0" smtClean="0"/>
-              <a:t>They </a:t>
-            </a:r>
-            <a:r>
-              <a:rPr lang="en-GB" dirty="0" smtClean="0"/>
-              <a:t>have adopted the “MCP” name, though purpose is not exactly the </a:t>
-            </a:r>
-            <a:r>
-              <a:rPr lang="en-GB" dirty="0" smtClean="0"/>
-              <a:t>same</a:t>
+              <a:t>They have adopted the “MCP” name, though purpose is not exactly the same</a:t>
             </a:r>
             <a:endParaRPr lang="en-GB" dirty="0"/>
           </a:p>
@@ -10891,7 +10436,6 @@
               <a:rPr lang="en-GB" dirty="0"/>
               <a:t>Documents</a:t>
             </a:r>
-            <a:endParaRPr lang="en-GB" dirty="0"/>
           </a:p>
         </p:txBody>
       </p:sp>
@@ -10925,7 +10469,7 @@
             </a:r>
             <a:r>
               <a:rPr lang="en-GB" dirty="0" err="1" smtClean="0"/>
-              <a:t>kuehlewind</a:t>
+              <a:t>ietf</a:t>
             </a:r>
             <a:r>
               <a:rPr lang="en-GB" dirty="0" smtClean="0"/>
@@ -10939,6 +10483,7 @@
               <a:rPr lang="en-GB" dirty="0" smtClean="0"/>
               <a:t>-manageability</a:t>
             </a:r>
+            <a:endParaRPr lang="en-GB" dirty="0" smtClean="0"/>
           </a:p>
           <a:p>
             <a:pPr lvl="1"/>
@@ -10948,7 +10493,7 @@
             </a:r>
             <a:r>
               <a:rPr lang="en-GB" dirty="0" err="1" smtClean="0"/>
-              <a:t>kuehlewind</a:t>
+              <a:t>ietf</a:t>
             </a:r>
             <a:r>
               <a:rPr lang="en-GB" dirty="0" smtClean="0"/>
@@ -10962,6 +10507,7 @@
               <a:rPr lang="en-GB" dirty="0" smtClean="0"/>
               <a:t>-applicability</a:t>
             </a:r>
+            <a:endParaRPr lang="en-GB" dirty="0" smtClean="0"/>
           </a:p>
           <a:p>
             <a:pPr lvl="1"/>
@@ -11013,6 +10559,46 @@
               <a:t>ecn</a:t>
             </a:r>
             <a:endParaRPr lang="en-GB" dirty="0" smtClean="0"/>
+          </a:p>
+          <a:p>
+            <a:pPr lvl="1"/>
+            <a:r>
+              <a:rPr lang="en-GB" dirty="0">
+                <a:solidFill>
+                  <a:schemeClr val="tx1"/>
+                </a:solidFill>
+              </a:rPr>
+              <a:t>draft-</a:t>
+            </a:r>
+            <a:r>
+              <a:rPr lang="en-GB" dirty="0" err="1">
+                <a:solidFill>
+                  <a:schemeClr val="tx1"/>
+                </a:solidFill>
+              </a:rPr>
+              <a:t>trammell</a:t>
+            </a:r>
+            <a:r>
+              <a:rPr lang="en-GB" dirty="0">
+                <a:solidFill>
+                  <a:schemeClr val="tx1"/>
+                </a:solidFill>
+              </a:rPr>
+              <a:t>-plus-</a:t>
+            </a:r>
+            <a:r>
+              <a:rPr lang="en-GB" dirty="0" err="1">
+                <a:solidFill>
+                  <a:schemeClr val="tx1"/>
+                </a:solidFill>
+              </a:rPr>
+              <a:t>statefulness</a:t>
+            </a:r>
+            <a:endParaRPr lang="en-GB" dirty="0">
+              <a:solidFill>
+                <a:schemeClr val="tx1"/>
+              </a:solidFill>
+            </a:endParaRPr>
           </a:p>
           <a:p>
             <a:pPr lvl="1"/>
@@ -11070,56 +10656,6 @@
               <a:rPr lang="en-GB" dirty="0" smtClean="0">
                 <a:solidFill>
                   <a:schemeClr val="bg1">
-                    <a:lumMod val="50000"/>
-                  </a:schemeClr>
-                </a:solidFill>
-              </a:rPr>
-              <a:t>draft-</a:t>
-            </a:r>
-            <a:r>
-              <a:rPr lang="en-GB" dirty="0" err="1" smtClean="0">
-                <a:solidFill>
-                  <a:schemeClr val="bg1">
-                    <a:lumMod val="50000"/>
-                  </a:schemeClr>
-                </a:solidFill>
-              </a:rPr>
-              <a:t>trammell</a:t>
-            </a:r>
-            <a:r>
-              <a:rPr lang="en-GB" dirty="0" smtClean="0">
-                <a:solidFill>
-                  <a:schemeClr val="bg1">
-                    <a:lumMod val="50000"/>
-                  </a:schemeClr>
-                </a:solidFill>
-              </a:rPr>
-              <a:t>-plus-</a:t>
-            </a:r>
-            <a:r>
-              <a:rPr lang="en-GB" dirty="0" err="1" smtClean="0">
-                <a:solidFill>
-                  <a:schemeClr val="bg1">
-                    <a:lumMod val="50000"/>
-                  </a:schemeClr>
-                </a:solidFill>
-              </a:rPr>
-              <a:t>statefulness</a:t>
-            </a:r>
-            <a:endParaRPr lang="en-GB" dirty="0" smtClean="0">
-              <a:solidFill>
-                <a:schemeClr val="bg1">
-                  <a:lumMod val="50000"/>
-                </a:schemeClr>
-              </a:solidFill>
-            </a:endParaRPr>
-          </a:p>
-          <a:p>
-            <a:pPr lvl="1"/>
-            <a:r>
-              <a:rPr lang="en-GB" dirty="0" smtClean="0">
-                <a:solidFill>
-                  <a:schemeClr val="bg1">
                     <a:lumMod val="65000"/>
                   </a:schemeClr>
                 </a:solidFill>
@@ -11146,6 +10682,13 @@
               </a:rPr>
               <a:t>-plus-spec</a:t>
             </a:r>
+            <a:endParaRPr lang="en-GB" dirty="0" smtClean="0">
+              <a:solidFill>
+                <a:schemeClr val="bg1">
+                  <a:lumMod val="65000"/>
+                </a:schemeClr>
+              </a:solidFill>
+            </a:endParaRPr>
           </a:p>
           <a:p>
             <a:pPr lvl="1"/>
@@ -11470,7 +11013,6 @@
               <a:rPr lang="en-US" dirty="0" smtClean="0"/>
               <a:t>TSVWG and QUIC</a:t>
             </a:r>
-            <a:endParaRPr lang="en-US" dirty="0" smtClean="0"/>
           </a:p>
           <a:p>
             <a:pPr lvl="1"/>
@@ -11486,7 +11028,6 @@
               <a:rPr lang="en-US" dirty="0" smtClean="0"/>
               <a:t>design </a:t>
             </a:r>
-            <a:endParaRPr lang="en-US" dirty="0" smtClean="0"/>
           </a:p>
           <a:p>
             <a:r>
@@ -11518,11 +11059,7 @@
           <a:p>
             <a:r>
               <a:rPr lang="en-GB" dirty="0" smtClean="0"/>
-              <a:t>Building </a:t>
-            </a:r>
-            <a:r>
-              <a:rPr lang="en-GB" dirty="0" smtClean="0"/>
-              <a:t>awareness in ETSI NFV</a:t>
+              <a:t>Building awareness in ETSI NFV</a:t>
             </a:r>
           </a:p>
           <a:p>
@@ -11649,7 +11186,7 @@
         <p:spPr/>
         <p:txBody>
           <a:bodyPr>
-            <a:normAutofit fontScale="85000" lnSpcReduction="20000"/>
+            <a:normAutofit fontScale="92500" lnSpcReduction="20000"/>
           </a:bodyPr>
           <a:lstStyle/>
           <a:p>
@@ -11724,12 +11261,6 @@
             <a:r>
               <a:rPr lang="en-GB" dirty="0" smtClean="0"/>
               <a:t>Including recent discussion in the TLS WG</a:t>
-            </a:r>
-          </a:p>
-          <a:p>
-            <a:r>
-              <a:rPr lang="en-GB" dirty="0" smtClean="0"/>
-              <a:t>IETF related documents</a:t>
             </a:r>
           </a:p>
           <a:p>

</xml_diff>